<commit_message>
analiza spozycia uzywek 3
</commit_message>
<xml_diff>
--- a/prez.pptx
+++ b/prez.pptx
@@ -6612,7 +6612,7 @@
         </p:blipFill>
         <p:spPr>
           <a:xfrm>
-            <a:off x="2132167" y="957262"/>
+            <a:off x="489688" y="1152570"/>
             <a:ext cx="4962525" cy="4943475"/>
           </a:xfrm>
           <a:prstGeom prst="rect">
@@ -6651,6 +6651,36 @@
           <a:xfrm>
             <a:off x="10539274" y="5821532"/>
             <a:ext cx="914400" cy="914400"/>
+          </a:xfrm>
+          <a:prstGeom prst="rect">
+            <a:avLst/>
+          </a:prstGeom>
+        </p:spPr>
+      </p:pic>
+      <p:pic>
+        <p:nvPicPr>
+          <p:cNvPr id="3" name="Obraz 2">
+            <a:extLst>
+              <a:ext uri="{FF2B5EF4-FFF2-40B4-BE49-F238E27FC236}">
+                <a16:creationId xmlns:a16="http://schemas.microsoft.com/office/drawing/2014/main" id="{529730D3-41B5-4A01-9975-EE44DB6B2F47}"/>
+              </a:ext>
+            </a:extLst>
+          </p:cNvPr>
+          <p:cNvPicPr>
+            <a:picLocks noChangeAspect="1"/>
+          </p:cNvPicPr>
+          <p:nvPr/>
+        </p:nvPicPr>
+        <p:blipFill>
+          <a:blip r:embed="rId6"/>
+          <a:stretch>
+            <a:fillRect/>
+          </a:stretch>
+        </p:blipFill>
+        <p:spPr>
+          <a:xfrm>
+            <a:off x="5519229" y="2439199"/>
+            <a:ext cx="4619070" cy="1979601"/>
           </a:xfrm>
           <a:prstGeom prst="rect">
             <a:avLst/>

</xml_diff>